<commit_message>
change test service into cluster
</commit_message>
<xml_diff>
--- a/docs/LayardArchitecturalOverview.pptx
+++ b/docs/LayardArchitecturalOverview.pptx
@@ -259,7 +259,7 @@
           <a:p>
             <a:fld id="{12C4E39A-9D43-8547-8ED7-9E99CFD6D622}" type="datetimeFigureOut">
               <a:rPr kumimoji="1" lang="ja-JP" altLang="en-US" smtClean="0"/>
-              <a:t>2020/3/3</a:t>
+              <a:t>2020/3/17</a:t>
             </a:fld>
             <a:endParaRPr kumimoji="1" lang="ja-JP" altLang="en-US"/>
           </a:p>
@@ -489,7 +489,7 @@
           <a:p>
             <a:fld id="{12C4E39A-9D43-8547-8ED7-9E99CFD6D622}" type="datetimeFigureOut">
               <a:rPr kumimoji="1" lang="ja-JP" altLang="en-US" smtClean="0"/>
-              <a:t>2020/3/3</a:t>
+              <a:t>2020/3/17</a:t>
             </a:fld>
             <a:endParaRPr kumimoji="1" lang="ja-JP" altLang="en-US"/>
           </a:p>
@@ -729,7 +729,7 @@
           <a:p>
             <a:fld id="{12C4E39A-9D43-8547-8ED7-9E99CFD6D622}" type="datetimeFigureOut">
               <a:rPr kumimoji="1" lang="ja-JP" altLang="en-US" smtClean="0"/>
-              <a:t>2020/3/3</a:t>
+              <a:t>2020/3/17</a:t>
             </a:fld>
             <a:endParaRPr kumimoji="1" lang="ja-JP" altLang="en-US"/>
           </a:p>
@@ -959,7 +959,7 @@
           <a:p>
             <a:fld id="{12C4E39A-9D43-8547-8ED7-9E99CFD6D622}" type="datetimeFigureOut">
               <a:rPr kumimoji="1" lang="ja-JP" altLang="en-US" smtClean="0"/>
-              <a:t>2020/3/3</a:t>
+              <a:t>2020/3/17</a:t>
             </a:fld>
             <a:endParaRPr kumimoji="1" lang="ja-JP" altLang="en-US"/>
           </a:p>
@@ -1234,7 +1234,7 @@
           <a:p>
             <a:fld id="{12C4E39A-9D43-8547-8ED7-9E99CFD6D622}" type="datetimeFigureOut">
               <a:rPr kumimoji="1" lang="ja-JP" altLang="en-US" smtClean="0"/>
-              <a:t>2020/3/3</a:t>
+              <a:t>2020/3/17</a:t>
             </a:fld>
             <a:endParaRPr kumimoji="1" lang="ja-JP" altLang="en-US"/>
           </a:p>
@@ -1563,7 +1563,7 @@
           <a:p>
             <a:fld id="{12C4E39A-9D43-8547-8ED7-9E99CFD6D622}" type="datetimeFigureOut">
               <a:rPr kumimoji="1" lang="ja-JP" altLang="en-US" smtClean="0"/>
-              <a:t>2020/3/3</a:t>
+              <a:t>2020/3/17</a:t>
             </a:fld>
             <a:endParaRPr kumimoji="1" lang="ja-JP" altLang="en-US"/>
           </a:p>
@@ -2039,7 +2039,7 @@
           <a:p>
             <a:fld id="{12C4E39A-9D43-8547-8ED7-9E99CFD6D622}" type="datetimeFigureOut">
               <a:rPr kumimoji="1" lang="ja-JP" altLang="en-US" smtClean="0"/>
-              <a:t>2020/3/3</a:t>
+              <a:t>2020/3/17</a:t>
             </a:fld>
             <a:endParaRPr kumimoji="1" lang="ja-JP" altLang="en-US"/>
           </a:p>
@@ -2180,7 +2180,7 @@
           <a:p>
             <a:fld id="{12C4E39A-9D43-8547-8ED7-9E99CFD6D622}" type="datetimeFigureOut">
               <a:rPr kumimoji="1" lang="ja-JP" altLang="en-US" smtClean="0"/>
-              <a:t>2020/3/3</a:t>
+              <a:t>2020/3/17</a:t>
             </a:fld>
             <a:endParaRPr kumimoji="1" lang="ja-JP" altLang="en-US"/>
           </a:p>
@@ -2293,7 +2293,7 @@
           <a:p>
             <a:fld id="{12C4E39A-9D43-8547-8ED7-9E99CFD6D622}" type="datetimeFigureOut">
               <a:rPr kumimoji="1" lang="ja-JP" altLang="en-US" smtClean="0"/>
-              <a:t>2020/3/3</a:t>
+              <a:t>2020/3/17</a:t>
             </a:fld>
             <a:endParaRPr kumimoji="1" lang="ja-JP" altLang="en-US"/>
           </a:p>
@@ -2636,7 +2636,7 @@
           <a:p>
             <a:fld id="{12C4E39A-9D43-8547-8ED7-9E99CFD6D622}" type="datetimeFigureOut">
               <a:rPr kumimoji="1" lang="ja-JP" altLang="en-US" smtClean="0"/>
-              <a:t>2020/3/3</a:t>
+              <a:t>2020/3/17</a:t>
             </a:fld>
             <a:endParaRPr kumimoji="1" lang="ja-JP" altLang="en-US"/>
           </a:p>
@@ -2924,7 +2924,7 @@
           <a:p>
             <a:fld id="{12C4E39A-9D43-8547-8ED7-9E99CFD6D622}" type="datetimeFigureOut">
               <a:rPr kumimoji="1" lang="ja-JP" altLang="en-US" smtClean="0"/>
-              <a:t>2020/3/3</a:t>
+              <a:t>2020/3/17</a:t>
             </a:fld>
             <a:endParaRPr kumimoji="1" lang="ja-JP" altLang="en-US"/>
           </a:p>
@@ -3197,7 +3197,7 @@
           <a:p>
             <a:fld id="{12C4E39A-9D43-8547-8ED7-9E99CFD6D622}" type="datetimeFigureOut">
               <a:rPr kumimoji="1" lang="ja-JP" altLang="en-US" smtClean="0"/>
-              <a:t>2020/3/3</a:t>
+              <a:t>2020/3/17</a:t>
             </a:fld>
             <a:endParaRPr kumimoji="1" lang="ja-JP" altLang="en-US"/>
           </a:p>
@@ -3636,7 +3636,7 @@
         </p:blipFill>
         <p:spPr>
           <a:xfrm>
-            <a:off x="2079724" y="189376"/>
+            <a:off x="74685" y="220199"/>
             <a:ext cx="2033790" cy="575976"/>
           </a:xfrm>
           <a:prstGeom prst="rect">
@@ -3666,7 +3666,7 @@
         </p:blipFill>
         <p:spPr>
           <a:xfrm>
-            <a:off x="2765697" y="5583830"/>
+            <a:off x="3043989" y="4351384"/>
             <a:ext cx="1058961" cy="648614"/>
           </a:xfrm>
           <a:prstGeom prst="rect">
@@ -3696,7 +3696,7 @@
         </p:blipFill>
         <p:spPr>
           <a:xfrm>
-            <a:off x="5171282" y="3343685"/>
+            <a:off x="5310428" y="2349779"/>
             <a:ext cx="2062412" cy="1158188"/>
           </a:xfrm>
           <a:prstGeom prst="rect">
@@ -3726,7 +3726,7 @@
         </p:blipFill>
         <p:spPr>
           <a:xfrm>
-            <a:off x="3963857" y="5476485"/>
+            <a:off x="4435899" y="4323466"/>
             <a:ext cx="941788" cy="863305"/>
           </a:xfrm>
           <a:prstGeom prst="rect">
@@ -3756,7 +3756,7 @@
         </p:blipFill>
         <p:spPr>
           <a:xfrm>
-            <a:off x="4187541" y="3343685"/>
+            <a:off x="4326687" y="2349779"/>
             <a:ext cx="1158188" cy="1158188"/>
           </a:xfrm>
           <a:prstGeom prst="rect">
@@ -3786,7 +3786,7 @@
         </p:blipFill>
         <p:spPr>
           <a:xfrm>
-            <a:off x="3187455" y="1594586"/>
+            <a:off x="3326601" y="859094"/>
             <a:ext cx="1000814" cy="749046"/>
           </a:xfrm>
           <a:prstGeom prst="rect">
@@ -3816,7 +3816,7 @@
         </p:blipFill>
         <p:spPr>
           <a:xfrm>
-            <a:off x="8455443" y="3580154"/>
+            <a:off x="8594589" y="2586248"/>
             <a:ext cx="988484" cy="685250"/>
           </a:xfrm>
           <a:prstGeom prst="rect">
@@ -3846,7 +3846,7 @@
         </p:blipFill>
         <p:spPr>
           <a:xfrm>
-            <a:off x="3262055" y="3642053"/>
+            <a:off x="3401201" y="2648147"/>
             <a:ext cx="561453" cy="561453"/>
           </a:xfrm>
           <a:prstGeom prst="rect">
@@ -3876,7 +3876,7 @@
         </p:blipFill>
         <p:spPr>
           <a:xfrm>
-            <a:off x="6748150" y="5515726"/>
+            <a:off x="7147211" y="4564149"/>
             <a:ext cx="567342" cy="784823"/>
           </a:xfrm>
           <a:prstGeom prst="rect">
@@ -3898,8 +3898,8 @@
         </p:nvSpPr>
         <p:spPr>
           <a:xfrm>
-            <a:off x="2043113" y="834558"/>
-            <a:ext cx="9672637" cy="5894537"/>
+            <a:off x="2182259" y="168638"/>
+            <a:ext cx="9672637" cy="6530335"/>
           </a:xfrm>
           <a:prstGeom prst="roundRect">
             <a:avLst>
@@ -3947,7 +3947,7 @@
         </p:nvSpPr>
         <p:spPr>
           <a:xfrm>
-            <a:off x="2696650" y="1096269"/>
+            <a:off x="2835796" y="360777"/>
             <a:ext cx="8390861" cy="1499526"/>
           </a:xfrm>
           <a:prstGeom prst="roundRect">
@@ -4022,7 +4022,7 @@
         </p:blipFill>
         <p:spPr>
           <a:xfrm>
-            <a:off x="7172567" y="1674284"/>
+            <a:off x="7311713" y="938792"/>
             <a:ext cx="589650" cy="589650"/>
           </a:xfrm>
           <a:prstGeom prst="rect">
@@ -4058,8 +4058,8 @@
         </p:blipFill>
         <p:spPr>
           <a:xfrm>
-            <a:off x="682856" y="3470419"/>
-            <a:ext cx="624548" cy="624548"/>
+            <a:off x="776303" y="2738923"/>
+            <a:ext cx="755703" cy="755703"/>
           </a:xfrm>
           <a:prstGeom prst="rect">
             <a:avLst/>
@@ -4080,7 +4080,7 @@
         </p:nvGrpSpPr>
         <p:grpSpPr>
           <a:xfrm>
-            <a:off x="618649" y="1626771"/>
+            <a:off x="757795" y="960852"/>
             <a:ext cx="755703" cy="755703"/>
             <a:chOff x="747864" y="3706346"/>
             <a:chExt cx="914400" cy="914400"/>
@@ -4176,8 +4176,8 @@
         </p:nvCxnSpPr>
         <p:spPr>
           <a:xfrm>
-            <a:off x="1307404" y="3782693"/>
-            <a:ext cx="735709" cy="1"/>
+            <a:off x="1532006" y="3116775"/>
+            <a:ext cx="670131" cy="0"/>
           </a:xfrm>
           <a:prstGeom prst="straightConnector1">
             <a:avLst/>
@@ -4224,7 +4224,7 @@
         </p:nvCxnSpPr>
         <p:spPr>
           <a:xfrm>
-            <a:off x="1374352" y="2004623"/>
+            <a:off x="1513498" y="1338704"/>
             <a:ext cx="668761" cy="0"/>
           </a:xfrm>
           <a:prstGeom prst="straightConnector1">
@@ -4269,7 +4269,7 @@
         </p:nvSpPr>
         <p:spPr>
           <a:xfrm>
-            <a:off x="2696650" y="3050238"/>
+            <a:off x="2835796" y="2056332"/>
             <a:ext cx="8390861" cy="1499526"/>
           </a:xfrm>
           <a:prstGeom prst="roundRect">
@@ -4336,8 +4336,8 @@
         </p:nvSpPr>
         <p:spPr>
           <a:xfrm>
-            <a:off x="2696650" y="5004207"/>
-            <a:ext cx="8390861" cy="1499526"/>
+            <a:off x="2835796" y="3771761"/>
+            <a:ext cx="8390861" cy="2725462"/>
           </a:xfrm>
           <a:prstGeom prst="roundRect">
             <a:avLst>
@@ -4411,7 +4411,7 @@
         </p:blipFill>
         <p:spPr>
           <a:xfrm>
-            <a:off x="8914654" y="1732517"/>
+            <a:off x="9053800" y="997025"/>
             <a:ext cx="1569081" cy="473185"/>
           </a:xfrm>
           <a:prstGeom prst="rect">
@@ -4441,7 +4441,7 @@
         </p:blipFill>
         <p:spPr>
           <a:xfrm>
-            <a:off x="9879080" y="3653782"/>
+            <a:off x="10018226" y="2659876"/>
             <a:ext cx="584776" cy="537994"/>
           </a:xfrm>
           <a:prstGeom prst="rect">
@@ -4471,7 +4471,7 @@
         </p:blipFill>
         <p:spPr>
           <a:xfrm>
-            <a:off x="7282767" y="3580154"/>
+            <a:off x="7421913" y="2586248"/>
             <a:ext cx="839123" cy="685250"/>
           </a:xfrm>
           <a:prstGeom prst="rect">
@@ -4501,7 +4501,7 @@
         </p:blipFill>
         <p:spPr>
           <a:xfrm>
-            <a:off x="7751259" y="5530158"/>
+            <a:off x="3262648" y="5370631"/>
             <a:ext cx="652645" cy="755959"/>
           </a:xfrm>
           <a:prstGeom prst="rect">
@@ -4531,7 +4531,7 @@
         </p:blipFill>
         <p:spPr>
           <a:xfrm>
-            <a:off x="5217842" y="5573702"/>
+            <a:off x="4435899" y="5394351"/>
             <a:ext cx="1131612" cy="668871"/>
           </a:xfrm>
           <a:prstGeom prst="rect">
@@ -4561,7 +4561,7 @@
         </p:blipFill>
         <p:spPr>
           <a:xfrm>
-            <a:off x="5340707" y="1629398"/>
+            <a:off x="5479853" y="893906"/>
             <a:ext cx="679422" cy="679422"/>
           </a:xfrm>
           <a:prstGeom prst="rect">
@@ -4569,12 +4569,72 @@
           </a:prstGeom>
         </p:spPr>
       </p:pic>
-      <p:sp>
-        <p:nvSpPr>
-          <p:cNvPr id="31" name="角丸四角形 30">
-            <a:extLst>
-              <a:ext uri="{FF2B5EF4-FFF2-40B4-BE49-F238E27FC236}">
-                <a16:creationId xmlns:a16="http://schemas.microsoft.com/office/drawing/2014/main" id="{9E855DE0-C1A1-1848-BD18-87D9D710EE6F}"/>
+      <p:pic>
+        <p:nvPicPr>
+          <p:cNvPr id="12" name="図 11" descr="挿絵 が含まれている画像&#10;&#10;自動的に生成された説明">
+            <a:extLst>
+              <a:ext uri="{FF2B5EF4-FFF2-40B4-BE49-F238E27FC236}">
+                <a16:creationId xmlns:a16="http://schemas.microsoft.com/office/drawing/2014/main" id="{FFC5D7A8-7C4F-BE46-9458-EC489F6E1F06}"/>
+              </a:ext>
+            </a:extLst>
+          </p:cNvPr>
+          <p:cNvPicPr>
+            <a:picLocks noChangeAspect="1"/>
+          </p:cNvPicPr>
+          <p:nvPr/>
+        </p:nvPicPr>
+        <p:blipFill>
+          <a:blip r:embed="rId24"/>
+          <a:stretch>
+            <a:fillRect/>
+          </a:stretch>
+        </p:blipFill>
+        <p:spPr>
+          <a:xfrm>
+            <a:off x="9192372" y="4939259"/>
+            <a:ext cx="784823" cy="784823"/>
+          </a:xfrm>
+          <a:prstGeom prst="rect">
+            <a:avLst/>
+          </a:prstGeom>
+        </p:spPr>
+      </p:pic>
+      <p:pic>
+        <p:nvPicPr>
+          <p:cNvPr id="19" name="図 18" descr="挿絵 が含まれている画像&#10;&#10;自動的に生成された説明">
+            <a:extLst>
+              <a:ext uri="{FF2B5EF4-FFF2-40B4-BE49-F238E27FC236}">
+                <a16:creationId xmlns:a16="http://schemas.microsoft.com/office/drawing/2014/main" id="{55F8A625-1EAA-2143-918B-7E3443831A6D}"/>
+              </a:ext>
+            </a:extLst>
+          </p:cNvPr>
+          <p:cNvPicPr>
+            <a:picLocks noChangeAspect="1"/>
+          </p:cNvPicPr>
+          <p:nvPr/>
+        </p:nvPicPr>
+        <p:blipFill>
+          <a:blip r:embed="rId25"/>
+          <a:stretch>
+            <a:fillRect/>
+          </a:stretch>
+        </p:blipFill>
+        <p:spPr>
+          <a:xfrm>
+            <a:off x="9915197" y="4980975"/>
+            <a:ext cx="1143744" cy="701390"/>
+          </a:xfrm>
+          <a:prstGeom prst="rect">
+            <a:avLst/>
+          </a:prstGeom>
+        </p:spPr>
+      </p:pic>
+      <p:sp>
+        <p:nvSpPr>
+          <p:cNvPr id="36" name="角丸四角形 26">
+            <a:extLst>
+              <a:ext uri="{FF2B5EF4-FFF2-40B4-BE49-F238E27FC236}">
+                <a16:creationId xmlns:a16="http://schemas.microsoft.com/office/drawing/2014/main" id="{A5DE0B08-5B86-DD4F-8126-059520EDDF1D}"/>
               </a:ext>
             </a:extLst>
           </p:cNvPr>
@@ -4583,8 +4643,8 @@
         </p:nvSpPr>
         <p:spPr>
           <a:xfrm>
-            <a:off x="285884" y="3174689"/>
-            <a:ext cx="1479696" cy="3554392"/>
+            <a:off x="9068268" y="4249872"/>
+            <a:ext cx="1984848" cy="2031658"/>
           </a:xfrm>
           <a:prstGeom prst="roundRect">
             <a:avLst>
@@ -4623,7 +4683,7 @@
                   </a:schemeClr>
                 </a:solidFill>
               </a:rPr>
-              <a:t>Test</a:t>
+              <a:t>Optional</a:t>
             </a:r>
             <a:endParaRPr kumimoji="1" lang="en-US" altLang="ja-JP" sz="1400" dirty="0">
               <a:solidFill>
@@ -4638,10 +4698,10 @@
       </p:sp>
       <p:pic>
         <p:nvPicPr>
-          <p:cNvPr id="12" name="図 11" descr="挿絵 が含まれている画像&#10;&#10;自動的に生成された説明">
-            <a:extLst>
-              <a:ext uri="{FF2B5EF4-FFF2-40B4-BE49-F238E27FC236}">
-                <a16:creationId xmlns:a16="http://schemas.microsoft.com/office/drawing/2014/main" id="{FFC5D7A8-7C4F-BE46-9458-EC489F6E1F06}"/>
+          <p:cNvPr id="24" name="図 23">
+            <a:extLst>
+              <a:ext uri="{FF2B5EF4-FFF2-40B4-BE49-F238E27FC236}">
+                <a16:creationId xmlns:a16="http://schemas.microsoft.com/office/drawing/2014/main" id="{69422951-62CE-2742-A011-6A0E551381FC}"/>
               </a:ext>
             </a:extLst>
           </p:cNvPr>
@@ -4651,15 +4711,15 @@
           <p:nvPr/>
         </p:nvPicPr>
         <p:blipFill>
-          <a:blip r:embed="rId24"/>
+          <a:blip r:embed="rId26"/>
           <a:stretch>
             <a:fillRect/>
           </a:stretch>
         </p:blipFill>
         <p:spPr>
           <a:xfrm>
-            <a:off x="8864385" y="5515726"/>
-            <a:ext cx="784823" cy="784823"/>
+            <a:off x="7938026" y="5473755"/>
+            <a:ext cx="854218" cy="514839"/>
           </a:xfrm>
           <a:prstGeom prst="rect">
             <a:avLst/>
@@ -4668,10 +4728,10 @@
       </p:pic>
       <p:pic>
         <p:nvPicPr>
-          <p:cNvPr id="19" name="図 18" descr="挿絵 が含まれている画像&#10;&#10;自動的に生成された説明">
-            <a:extLst>
-              <a:ext uri="{FF2B5EF4-FFF2-40B4-BE49-F238E27FC236}">
-                <a16:creationId xmlns:a16="http://schemas.microsoft.com/office/drawing/2014/main" id="{55F8A625-1EAA-2143-918B-7E3443831A6D}"/>
+          <p:cNvPr id="30" name="図 29" descr="抽象, 挿絵, 記号 が含まれている画像&#10;&#10;自動的に生成された説明">
+            <a:extLst>
+              <a:ext uri="{FF2B5EF4-FFF2-40B4-BE49-F238E27FC236}">
+                <a16:creationId xmlns:a16="http://schemas.microsoft.com/office/drawing/2014/main" id="{D8D29A36-D30E-0041-B6DB-0DDB28A25667}"/>
               </a:ext>
             </a:extLst>
           </p:cNvPr>
@@ -4681,27 +4741,57 @@
           <p:nvPr/>
         </p:nvPicPr>
         <p:blipFill>
-          <a:blip r:embed="rId25"/>
+          <a:blip r:embed="rId27"/>
           <a:stretch>
             <a:fillRect/>
           </a:stretch>
         </p:blipFill>
         <p:spPr>
           <a:xfrm>
-            <a:off x="9776051" y="5557442"/>
-            <a:ext cx="1143744" cy="701390"/>
+            <a:off x="6309950" y="5557730"/>
+            <a:ext cx="519457" cy="519457"/>
           </a:xfrm>
           <a:prstGeom prst="rect">
             <a:avLst/>
           </a:prstGeom>
         </p:spPr>
       </p:pic>
-      <p:sp>
-        <p:nvSpPr>
-          <p:cNvPr id="36" name="角丸四角形 26">
-            <a:extLst>
-              <a:ext uri="{FF2B5EF4-FFF2-40B4-BE49-F238E27FC236}">
-                <a16:creationId xmlns:a16="http://schemas.microsoft.com/office/drawing/2014/main" id="{A5DE0B08-5B86-DD4F-8126-059520EDDF1D}"/>
+      <p:pic>
+        <p:nvPicPr>
+          <p:cNvPr id="41" name="図 40" descr="グラフィック, 挿絵 が含まれている画像&#10;&#10;自動的に生成された説明">
+            <a:extLst>
+              <a:ext uri="{FF2B5EF4-FFF2-40B4-BE49-F238E27FC236}">
+                <a16:creationId xmlns:a16="http://schemas.microsoft.com/office/drawing/2014/main" id="{58425D29-3C33-524D-A990-13142E627E24}"/>
+              </a:ext>
+            </a:extLst>
+          </p:cNvPr>
+          <p:cNvPicPr>
+            <a:picLocks noChangeAspect="1"/>
+          </p:cNvPicPr>
+          <p:nvPr/>
+        </p:nvPicPr>
+        <p:blipFill>
+          <a:blip r:embed="rId28"/>
+          <a:stretch>
+            <a:fillRect/>
+          </a:stretch>
+        </p:blipFill>
+        <p:spPr>
+          <a:xfrm>
+            <a:off x="7165783" y="5542250"/>
+            <a:ext cx="505605" cy="519457"/>
+          </a:xfrm>
+          <a:prstGeom prst="rect">
+            <a:avLst/>
+          </a:prstGeom>
+        </p:spPr>
+      </p:pic>
+      <p:sp>
+        <p:nvSpPr>
+          <p:cNvPr id="40" name="角丸四角形 26">
+            <a:extLst>
+              <a:ext uri="{FF2B5EF4-FFF2-40B4-BE49-F238E27FC236}">
+                <a16:creationId xmlns:a16="http://schemas.microsoft.com/office/drawing/2014/main" id="{6F513570-016F-4176-B3B6-D59EABB02527}"/>
               </a:ext>
             </a:extLst>
           </p:cNvPr>
@@ -4710,8 +4800,8 @@
         </p:nvSpPr>
         <p:spPr>
           <a:xfrm>
-            <a:off x="8839671" y="5276335"/>
-            <a:ext cx="1984848" cy="1063455"/>
+            <a:off x="6041121" y="4249872"/>
+            <a:ext cx="2837323" cy="2031658"/>
           </a:xfrm>
           <a:prstGeom prst="roundRect">
             <a:avLst>
@@ -4750,7 +4840,7 @@
                   </a:schemeClr>
                 </a:solidFill>
               </a:rPr>
-              <a:t>Optional</a:t>
+              <a:t>Test</a:t>
             </a:r>
             <a:endParaRPr kumimoji="1" lang="en-US" altLang="ja-JP" sz="1400" dirty="0">
               <a:solidFill>
@@ -4763,96 +4853,6 @@
           </a:p>
         </p:txBody>
       </p:sp>
-      <p:pic>
-        <p:nvPicPr>
-          <p:cNvPr id="24" name="図 23">
-            <a:extLst>
-              <a:ext uri="{FF2B5EF4-FFF2-40B4-BE49-F238E27FC236}">
-                <a16:creationId xmlns:a16="http://schemas.microsoft.com/office/drawing/2014/main" id="{69422951-62CE-2742-A011-6A0E551381FC}"/>
-              </a:ext>
-            </a:extLst>
-          </p:cNvPr>
-          <p:cNvPicPr>
-            <a:picLocks noChangeAspect="1"/>
-          </p:cNvPicPr>
-          <p:nvPr/>
-        </p:nvPicPr>
-        <p:blipFill>
-          <a:blip r:embed="rId26"/>
-          <a:stretch>
-            <a:fillRect/>
-          </a:stretch>
-        </p:blipFill>
-        <p:spPr>
-          <a:xfrm>
-            <a:off x="568021" y="6082370"/>
-            <a:ext cx="854218" cy="514839"/>
-          </a:xfrm>
-          <a:prstGeom prst="rect">
-            <a:avLst/>
-          </a:prstGeom>
-        </p:spPr>
-      </p:pic>
-      <p:pic>
-        <p:nvPicPr>
-          <p:cNvPr id="30" name="図 29" descr="抽象, 挿絵, 記号 が含まれている画像&#10;&#10;自動的に生成された説明">
-            <a:extLst>
-              <a:ext uri="{FF2B5EF4-FFF2-40B4-BE49-F238E27FC236}">
-                <a16:creationId xmlns:a16="http://schemas.microsoft.com/office/drawing/2014/main" id="{D8D29A36-D30E-0041-B6DB-0DDB28A25667}"/>
-              </a:ext>
-            </a:extLst>
-          </p:cNvPr>
-          <p:cNvPicPr>
-            <a:picLocks noChangeAspect="1"/>
-          </p:cNvPicPr>
-          <p:nvPr/>
-        </p:nvPicPr>
-        <p:blipFill>
-          <a:blip r:embed="rId27"/>
-          <a:stretch>
-            <a:fillRect/>
-          </a:stretch>
-        </p:blipFill>
-        <p:spPr>
-          <a:xfrm>
-            <a:off x="735402" y="4394654"/>
-            <a:ext cx="519457" cy="519457"/>
-          </a:xfrm>
-          <a:prstGeom prst="rect">
-            <a:avLst/>
-          </a:prstGeom>
-        </p:spPr>
-      </p:pic>
-      <p:pic>
-        <p:nvPicPr>
-          <p:cNvPr id="41" name="図 40" descr="グラフィック, 挿絵 が含まれている画像&#10;&#10;自動的に生成された説明">
-            <a:extLst>
-              <a:ext uri="{FF2B5EF4-FFF2-40B4-BE49-F238E27FC236}">
-                <a16:creationId xmlns:a16="http://schemas.microsoft.com/office/drawing/2014/main" id="{58425D29-3C33-524D-A990-13142E627E24}"/>
-              </a:ext>
-            </a:extLst>
-          </p:cNvPr>
-          <p:cNvPicPr>
-            <a:picLocks noChangeAspect="1"/>
-          </p:cNvPicPr>
-          <p:nvPr/>
-        </p:nvPicPr>
-        <p:blipFill>
-          <a:blip r:embed="rId28"/>
-          <a:stretch>
-            <a:fillRect/>
-          </a:stretch>
-        </p:blipFill>
-        <p:spPr>
-          <a:xfrm>
-            <a:off x="742328" y="5238512"/>
-            <a:ext cx="505605" cy="519457"/>
-          </a:xfrm>
-          <a:prstGeom prst="rect">
-            <a:avLst/>
-          </a:prstGeom>
-        </p:spPr>
-      </p:pic>
     </p:spTree>
     <p:extLst>
       <p:ext uri="{BB962C8B-B14F-4D97-AF65-F5344CB8AC3E}">

</xml_diff>

<commit_message>
add mongodb resource. fix #30
</commit_message>
<xml_diff>
--- a/docs/LayardArchitecturalOverview.pptx
+++ b/docs/LayardArchitecturalOverview.pptx
@@ -259,7 +259,7 @@
           <a:p>
             <a:fld id="{12C4E39A-9D43-8547-8ED7-9E99CFD6D622}" type="datetimeFigureOut">
               <a:rPr kumimoji="1" lang="ja-JP" altLang="en-US" smtClean="0"/>
-              <a:t>2020/3/17</a:t>
+              <a:t>2020/4/25</a:t>
             </a:fld>
             <a:endParaRPr kumimoji="1" lang="ja-JP" altLang="en-US"/>
           </a:p>
@@ -489,7 +489,7 @@
           <a:p>
             <a:fld id="{12C4E39A-9D43-8547-8ED7-9E99CFD6D622}" type="datetimeFigureOut">
               <a:rPr kumimoji="1" lang="ja-JP" altLang="en-US" smtClean="0"/>
-              <a:t>2020/3/17</a:t>
+              <a:t>2020/4/25</a:t>
             </a:fld>
             <a:endParaRPr kumimoji="1" lang="ja-JP" altLang="en-US"/>
           </a:p>
@@ -729,7 +729,7 @@
           <a:p>
             <a:fld id="{12C4E39A-9D43-8547-8ED7-9E99CFD6D622}" type="datetimeFigureOut">
               <a:rPr kumimoji="1" lang="ja-JP" altLang="en-US" smtClean="0"/>
-              <a:t>2020/3/17</a:t>
+              <a:t>2020/4/25</a:t>
             </a:fld>
             <a:endParaRPr kumimoji="1" lang="ja-JP" altLang="en-US"/>
           </a:p>
@@ -959,7 +959,7 @@
           <a:p>
             <a:fld id="{12C4E39A-9D43-8547-8ED7-9E99CFD6D622}" type="datetimeFigureOut">
               <a:rPr kumimoji="1" lang="ja-JP" altLang="en-US" smtClean="0"/>
-              <a:t>2020/3/17</a:t>
+              <a:t>2020/4/25</a:t>
             </a:fld>
             <a:endParaRPr kumimoji="1" lang="ja-JP" altLang="en-US"/>
           </a:p>
@@ -1234,7 +1234,7 @@
           <a:p>
             <a:fld id="{12C4E39A-9D43-8547-8ED7-9E99CFD6D622}" type="datetimeFigureOut">
               <a:rPr kumimoji="1" lang="ja-JP" altLang="en-US" smtClean="0"/>
-              <a:t>2020/3/17</a:t>
+              <a:t>2020/4/25</a:t>
             </a:fld>
             <a:endParaRPr kumimoji="1" lang="ja-JP" altLang="en-US"/>
           </a:p>
@@ -1563,7 +1563,7 @@
           <a:p>
             <a:fld id="{12C4E39A-9D43-8547-8ED7-9E99CFD6D622}" type="datetimeFigureOut">
               <a:rPr kumimoji="1" lang="ja-JP" altLang="en-US" smtClean="0"/>
-              <a:t>2020/3/17</a:t>
+              <a:t>2020/4/25</a:t>
             </a:fld>
             <a:endParaRPr kumimoji="1" lang="ja-JP" altLang="en-US"/>
           </a:p>
@@ -2039,7 +2039,7 @@
           <a:p>
             <a:fld id="{12C4E39A-9D43-8547-8ED7-9E99CFD6D622}" type="datetimeFigureOut">
               <a:rPr kumimoji="1" lang="ja-JP" altLang="en-US" smtClean="0"/>
-              <a:t>2020/3/17</a:t>
+              <a:t>2020/4/25</a:t>
             </a:fld>
             <a:endParaRPr kumimoji="1" lang="ja-JP" altLang="en-US"/>
           </a:p>
@@ -2180,7 +2180,7 @@
           <a:p>
             <a:fld id="{12C4E39A-9D43-8547-8ED7-9E99CFD6D622}" type="datetimeFigureOut">
               <a:rPr kumimoji="1" lang="ja-JP" altLang="en-US" smtClean="0"/>
-              <a:t>2020/3/17</a:t>
+              <a:t>2020/4/25</a:t>
             </a:fld>
             <a:endParaRPr kumimoji="1" lang="ja-JP" altLang="en-US"/>
           </a:p>
@@ -2293,7 +2293,7 @@
           <a:p>
             <a:fld id="{12C4E39A-9D43-8547-8ED7-9E99CFD6D622}" type="datetimeFigureOut">
               <a:rPr kumimoji="1" lang="ja-JP" altLang="en-US" smtClean="0"/>
-              <a:t>2020/3/17</a:t>
+              <a:t>2020/4/25</a:t>
             </a:fld>
             <a:endParaRPr kumimoji="1" lang="ja-JP" altLang="en-US"/>
           </a:p>
@@ -2636,7 +2636,7 @@
           <a:p>
             <a:fld id="{12C4E39A-9D43-8547-8ED7-9E99CFD6D622}" type="datetimeFigureOut">
               <a:rPr kumimoji="1" lang="ja-JP" altLang="en-US" smtClean="0"/>
-              <a:t>2020/3/17</a:t>
+              <a:t>2020/4/25</a:t>
             </a:fld>
             <a:endParaRPr kumimoji="1" lang="ja-JP" altLang="en-US"/>
           </a:p>
@@ -2924,7 +2924,7 @@
           <a:p>
             <a:fld id="{12C4E39A-9D43-8547-8ED7-9E99CFD6D622}" type="datetimeFigureOut">
               <a:rPr kumimoji="1" lang="ja-JP" altLang="en-US" smtClean="0"/>
-              <a:t>2020/3/17</a:t>
+              <a:t>2020/4/25</a:t>
             </a:fld>
             <a:endParaRPr kumimoji="1" lang="ja-JP" altLang="en-US"/>
           </a:p>
@@ -3197,7 +3197,7 @@
           <a:p>
             <a:fld id="{12C4E39A-9D43-8547-8ED7-9E99CFD6D622}" type="datetimeFigureOut">
               <a:rPr kumimoji="1" lang="ja-JP" altLang="en-US" smtClean="0"/>
-              <a:t>2020/3/17</a:t>
+              <a:t>2020/4/25</a:t>
             </a:fld>
             <a:endParaRPr kumimoji="1" lang="ja-JP" altLang="en-US"/>
           </a:p>
@@ -3696,7 +3696,7 @@
         </p:blipFill>
         <p:spPr>
           <a:xfrm>
-            <a:off x="5310428" y="2349779"/>
+            <a:off x="4661713" y="2349779"/>
             <a:ext cx="2062412" cy="1158188"/>
           </a:xfrm>
           <a:prstGeom prst="rect">
@@ -3756,7 +3756,7 @@
         </p:blipFill>
         <p:spPr>
           <a:xfrm>
-            <a:off x="4326687" y="2349779"/>
+            <a:off x="3797694" y="2349779"/>
             <a:ext cx="1158188" cy="1158188"/>
           </a:xfrm>
           <a:prstGeom prst="rect">
@@ -3816,7 +3816,7 @@
         </p:blipFill>
         <p:spPr>
           <a:xfrm>
-            <a:off x="8594589" y="2586248"/>
+            <a:off x="7816422" y="2586248"/>
             <a:ext cx="988484" cy="685250"/>
           </a:xfrm>
           <a:prstGeom prst="rect">
@@ -3846,7 +3846,7 @@
         </p:blipFill>
         <p:spPr>
           <a:xfrm>
-            <a:off x="3401201" y="2648147"/>
+            <a:off x="3033456" y="2648147"/>
             <a:ext cx="561453" cy="561453"/>
           </a:xfrm>
           <a:prstGeom prst="rect">
@@ -4441,7 +4441,7 @@
         </p:blipFill>
         <p:spPr>
           <a:xfrm>
-            <a:off x="10018226" y="2659876"/>
+            <a:off x="9153464" y="2659876"/>
             <a:ext cx="584776" cy="537994"/>
           </a:xfrm>
           <a:prstGeom prst="rect">
@@ -4471,7 +4471,7 @@
         </p:blipFill>
         <p:spPr>
           <a:xfrm>
-            <a:off x="7421913" y="2586248"/>
+            <a:off x="6598924" y="2586248"/>
             <a:ext cx="839123" cy="685250"/>
           </a:xfrm>
           <a:prstGeom prst="rect">
@@ -4853,6 +4853,36 @@
           </a:p>
         </p:txBody>
       </p:sp>
+      <p:pic>
+        <p:nvPicPr>
+          <p:cNvPr id="22" name="Picture 21" descr="A close up of a sign&#10;&#10;Description automatically generated">
+            <a:extLst>
+              <a:ext uri="{FF2B5EF4-FFF2-40B4-BE49-F238E27FC236}">
+                <a16:creationId xmlns:a16="http://schemas.microsoft.com/office/drawing/2014/main" id="{4D8DBDE8-430C-43F5-8F29-6F964A3FB4AB}"/>
+              </a:ext>
+            </a:extLst>
+          </p:cNvPr>
+          <p:cNvPicPr>
+            <a:picLocks noChangeAspect="1"/>
+          </p:cNvPicPr>
+          <p:nvPr/>
+        </p:nvPicPr>
+        <p:blipFill>
+          <a:blip r:embed="rId29"/>
+          <a:stretch>
+            <a:fillRect/>
+          </a:stretch>
+        </p:blipFill>
+        <p:spPr>
+          <a:xfrm>
+            <a:off x="10086799" y="2788914"/>
+            <a:ext cx="1036768" cy="279918"/>
+          </a:xfrm>
+          <a:prstGeom prst="rect">
+            <a:avLst/>
+          </a:prstGeom>
+        </p:spPr>
+      </p:pic>
     </p:spTree>
     <p:extLst>
       <p:ext uri="{BB962C8B-B14F-4D97-AF65-F5344CB8AC3E}">

</xml_diff>

<commit_message>
add kafka to overview #14
</commit_message>
<xml_diff>
--- a/docs/LayardArchitecturalOverview.pptx
+++ b/docs/LayardArchitecturalOverview.pptx
@@ -259,7 +259,7 @@
           <a:p>
             <a:fld id="{12C4E39A-9D43-8547-8ED7-9E99CFD6D622}" type="datetimeFigureOut">
               <a:rPr kumimoji="1" lang="ja-JP" altLang="en-US" smtClean="0"/>
-              <a:t>2020/4/25</a:t>
+              <a:t>2020/5/15</a:t>
             </a:fld>
             <a:endParaRPr kumimoji="1" lang="ja-JP" altLang="en-US"/>
           </a:p>
@@ -489,7 +489,7 @@
           <a:p>
             <a:fld id="{12C4E39A-9D43-8547-8ED7-9E99CFD6D622}" type="datetimeFigureOut">
               <a:rPr kumimoji="1" lang="ja-JP" altLang="en-US" smtClean="0"/>
-              <a:t>2020/4/25</a:t>
+              <a:t>2020/5/15</a:t>
             </a:fld>
             <a:endParaRPr kumimoji="1" lang="ja-JP" altLang="en-US"/>
           </a:p>
@@ -729,7 +729,7 @@
           <a:p>
             <a:fld id="{12C4E39A-9D43-8547-8ED7-9E99CFD6D622}" type="datetimeFigureOut">
               <a:rPr kumimoji="1" lang="ja-JP" altLang="en-US" smtClean="0"/>
-              <a:t>2020/4/25</a:t>
+              <a:t>2020/5/15</a:t>
             </a:fld>
             <a:endParaRPr kumimoji="1" lang="ja-JP" altLang="en-US"/>
           </a:p>
@@ -959,7 +959,7 @@
           <a:p>
             <a:fld id="{12C4E39A-9D43-8547-8ED7-9E99CFD6D622}" type="datetimeFigureOut">
               <a:rPr kumimoji="1" lang="ja-JP" altLang="en-US" smtClean="0"/>
-              <a:t>2020/4/25</a:t>
+              <a:t>2020/5/15</a:t>
             </a:fld>
             <a:endParaRPr kumimoji="1" lang="ja-JP" altLang="en-US"/>
           </a:p>
@@ -1234,7 +1234,7 @@
           <a:p>
             <a:fld id="{12C4E39A-9D43-8547-8ED7-9E99CFD6D622}" type="datetimeFigureOut">
               <a:rPr kumimoji="1" lang="ja-JP" altLang="en-US" smtClean="0"/>
-              <a:t>2020/4/25</a:t>
+              <a:t>2020/5/15</a:t>
             </a:fld>
             <a:endParaRPr kumimoji="1" lang="ja-JP" altLang="en-US"/>
           </a:p>
@@ -1563,7 +1563,7 @@
           <a:p>
             <a:fld id="{12C4E39A-9D43-8547-8ED7-9E99CFD6D622}" type="datetimeFigureOut">
               <a:rPr kumimoji="1" lang="ja-JP" altLang="en-US" smtClean="0"/>
-              <a:t>2020/4/25</a:t>
+              <a:t>2020/5/15</a:t>
             </a:fld>
             <a:endParaRPr kumimoji="1" lang="ja-JP" altLang="en-US"/>
           </a:p>
@@ -2039,7 +2039,7 @@
           <a:p>
             <a:fld id="{12C4E39A-9D43-8547-8ED7-9E99CFD6D622}" type="datetimeFigureOut">
               <a:rPr kumimoji="1" lang="ja-JP" altLang="en-US" smtClean="0"/>
-              <a:t>2020/4/25</a:t>
+              <a:t>2020/5/15</a:t>
             </a:fld>
             <a:endParaRPr kumimoji="1" lang="ja-JP" altLang="en-US"/>
           </a:p>
@@ -2180,7 +2180,7 @@
           <a:p>
             <a:fld id="{12C4E39A-9D43-8547-8ED7-9E99CFD6D622}" type="datetimeFigureOut">
               <a:rPr kumimoji="1" lang="ja-JP" altLang="en-US" smtClean="0"/>
-              <a:t>2020/4/25</a:t>
+              <a:t>2020/5/15</a:t>
             </a:fld>
             <a:endParaRPr kumimoji="1" lang="ja-JP" altLang="en-US"/>
           </a:p>
@@ -2293,7 +2293,7 @@
           <a:p>
             <a:fld id="{12C4E39A-9D43-8547-8ED7-9E99CFD6D622}" type="datetimeFigureOut">
               <a:rPr kumimoji="1" lang="ja-JP" altLang="en-US" smtClean="0"/>
-              <a:t>2020/4/25</a:t>
+              <a:t>2020/5/15</a:t>
             </a:fld>
             <a:endParaRPr kumimoji="1" lang="ja-JP" altLang="en-US"/>
           </a:p>
@@ -2636,7 +2636,7 @@
           <a:p>
             <a:fld id="{12C4E39A-9D43-8547-8ED7-9E99CFD6D622}" type="datetimeFigureOut">
               <a:rPr kumimoji="1" lang="ja-JP" altLang="en-US" smtClean="0"/>
-              <a:t>2020/4/25</a:t>
+              <a:t>2020/5/15</a:t>
             </a:fld>
             <a:endParaRPr kumimoji="1" lang="ja-JP" altLang="en-US"/>
           </a:p>
@@ -2924,7 +2924,7 @@
           <a:p>
             <a:fld id="{12C4E39A-9D43-8547-8ED7-9E99CFD6D622}" type="datetimeFigureOut">
               <a:rPr kumimoji="1" lang="ja-JP" altLang="en-US" smtClean="0"/>
-              <a:t>2020/4/25</a:t>
+              <a:t>2020/5/15</a:t>
             </a:fld>
             <a:endParaRPr kumimoji="1" lang="ja-JP" altLang="en-US"/>
           </a:p>
@@ -3197,7 +3197,7 @@
           <a:p>
             <a:fld id="{12C4E39A-9D43-8547-8ED7-9E99CFD6D622}" type="datetimeFigureOut">
               <a:rPr kumimoji="1" lang="ja-JP" altLang="en-US" smtClean="0"/>
-              <a:t>2020/4/25</a:t>
+              <a:t>2020/5/15</a:t>
             </a:fld>
             <a:endParaRPr kumimoji="1" lang="ja-JP" altLang="en-US"/>
           </a:p>
@@ -3696,7 +3696,7 @@
         </p:blipFill>
         <p:spPr>
           <a:xfrm>
-            <a:off x="4661713" y="2349779"/>
+            <a:off x="4245979" y="2349779"/>
             <a:ext cx="2062412" cy="1158188"/>
           </a:xfrm>
           <a:prstGeom prst="rect">
@@ -3756,7 +3756,7 @@
         </p:blipFill>
         <p:spPr>
           <a:xfrm>
-            <a:off x="3797694" y="2349779"/>
+            <a:off x="3631737" y="2349779"/>
             <a:ext cx="1158188" cy="1158188"/>
           </a:xfrm>
           <a:prstGeom prst="rect">
@@ -3816,7 +3816,7 @@
         </p:blipFill>
         <p:spPr>
           <a:xfrm>
-            <a:off x="7816422" y="2586248"/>
+            <a:off x="8106247" y="2586248"/>
             <a:ext cx="988484" cy="685250"/>
           </a:xfrm>
           <a:prstGeom prst="rect">
@@ -4441,7 +4441,7 @@
         </p:blipFill>
         <p:spPr>
           <a:xfrm>
-            <a:off x="9153464" y="2659876"/>
+            <a:off x="9242771" y="2659876"/>
             <a:ext cx="584776" cy="537994"/>
           </a:xfrm>
           <a:prstGeom prst="rect">
@@ -4471,7 +4471,7 @@
         </p:blipFill>
         <p:spPr>
           <a:xfrm>
-            <a:off x="6598924" y="2586248"/>
+            <a:off x="5937442" y="2586248"/>
             <a:ext cx="839123" cy="685250"/>
           </a:xfrm>
           <a:prstGeom prst="rect">
@@ -4877,6 +4877,36 @@
           <a:xfrm>
             <a:off x="10086799" y="2788914"/>
             <a:ext cx="1036768" cy="279918"/>
+          </a:xfrm>
+          <a:prstGeom prst="rect">
+            <a:avLst/>
+          </a:prstGeom>
+        </p:spPr>
+      </p:pic>
+      <p:pic>
+        <p:nvPicPr>
+          <p:cNvPr id="6" name="図 5" descr="黒い背景と白い文字&#10;&#10;自動的に生成された説明">
+            <a:extLst>
+              <a:ext uri="{FF2B5EF4-FFF2-40B4-BE49-F238E27FC236}">
+                <a16:creationId xmlns:a16="http://schemas.microsoft.com/office/drawing/2014/main" id="{C4A43211-FB2B-014A-8B6E-DBB67E9687FA}"/>
+              </a:ext>
+            </a:extLst>
+          </p:cNvPr>
+          <p:cNvPicPr>
+            <a:picLocks noChangeAspect="1"/>
+          </p:cNvPicPr>
+          <p:nvPr/>
+        </p:nvPicPr>
+        <p:blipFill>
+          <a:blip r:embed="rId30"/>
+          <a:stretch>
+            <a:fillRect/>
+          </a:stretch>
+        </p:blipFill>
+        <p:spPr>
+          <a:xfrm>
+            <a:off x="6961675" y="2657221"/>
+            <a:ext cx="1033603" cy="543304"/>
           </a:xfrm>
           <a:prstGeom prst="rect">
             <a:avLst/>

</xml_diff>

<commit_message>
add spring boot #1952
</commit_message>
<xml_diff>
--- a/docs/LayardArchitecturalOverview.pptx
+++ b/docs/LayardArchitecturalOverview.pptx
@@ -4459,7 +4459,7 @@
         </p:blipFill>
         <p:spPr>
           <a:xfrm>
-            <a:off x="7311713" y="660500"/>
+            <a:off x="6735243" y="660500"/>
             <a:ext cx="589650" cy="589650"/>
           </a:xfrm>
           <a:prstGeom prst="rect">
@@ -4848,7 +4848,7 @@
         </p:blipFill>
         <p:spPr>
           <a:xfrm>
-            <a:off x="9053800" y="718733"/>
+            <a:off x="9133312" y="718733"/>
             <a:ext cx="1569081" cy="473185"/>
           </a:xfrm>
           <a:prstGeom prst="rect">
@@ -4998,7 +4998,7 @@
         </p:blipFill>
         <p:spPr>
           <a:xfrm>
-            <a:off x="5479853" y="615614"/>
+            <a:off x="8034206" y="615614"/>
             <a:ext cx="679422" cy="679422"/>
           </a:xfrm>
           <a:prstGeom prst="rect">
@@ -5464,6 +5464,36 @@
           <a:xfrm>
             <a:off x="10280673" y="2748791"/>
             <a:ext cx="858441" cy="575423"/>
+          </a:xfrm>
+          <a:prstGeom prst="rect">
+            <a:avLst/>
+          </a:prstGeom>
+        </p:spPr>
+      </p:pic>
+      <p:pic>
+        <p:nvPicPr>
+          <p:cNvPr id="28" name="Picture 27" descr="A picture containing logo&#10;&#10;Description automatically generated">
+            <a:extLst>
+              <a:ext uri="{FF2B5EF4-FFF2-40B4-BE49-F238E27FC236}">
+                <a16:creationId xmlns:a16="http://schemas.microsoft.com/office/drawing/2014/main" id="{194E0E8F-27E7-42E9-A5D5-2BEBCE74B143}"/>
+              </a:ext>
+            </a:extLst>
+          </p:cNvPr>
+          <p:cNvPicPr>
+            <a:picLocks noChangeAspect="1"/>
+          </p:cNvPicPr>
+          <p:nvPr/>
+        </p:nvPicPr>
+        <p:blipFill>
+          <a:blip r:embed="rId36"/>
+          <a:stretch>
+            <a:fillRect/>
+          </a:stretch>
+        </p:blipFill>
+        <p:spPr>
+          <a:xfrm>
+            <a:off x="4766575" y="615093"/>
+            <a:ext cx="1368125" cy="718266"/>
           </a:xfrm>
           <a:prstGeom prst="rect">
             <a:avLst/>

</xml_diff>